<commit_message>
Refactor code for LinearRegression.ipynb, KNeighborsRegressor.ipynb, Bagging_Average_kfold.py, RandomForestRegressor.py, DecisionTreeRegressor.ipynb, and tinhVIF.py
</commit_message>
<xml_diff>
--- a/Report/Baocaonhom6.pptx
+++ b/Report/Baocaonhom6.pptx
@@ -281,7 +281,7 @@
           <a:p>
             <a:fld id="{72C55495-8837-4B60-B61B-A3B8D2D9AF31}" type="datetimeFigureOut">
               <a:rPr lang="en-US" smtClean="0"/>
-              <a:t>08/04/2024</a:t>
+              <a:t>4/9/2024</a:t>
             </a:fld>
             <a:endParaRPr lang="en-US"/>
           </a:p>
@@ -5384,6 +5384,127 @@
   <p:clrMapOvr>
     <a:masterClrMapping/>
   </p:clrMapOvr>
+  <p:timing>
+    <p:tnLst>
+      <p:par>
+        <p:cTn id="1" dur="indefinite" restart="never" nodeType="tmRoot">
+          <p:childTnLst>
+            <p:seq concurrent="1" nextAc="seek">
+              <p:cTn id="2" dur="indefinite" nodeType="mainSeq">
+                <p:childTnLst>
+                  <p:par>
+                    <p:cTn id="3" fill="hold">
+                      <p:stCondLst>
+                        <p:cond delay="indefinite"/>
+                      </p:stCondLst>
+                      <p:childTnLst>
+                        <p:par>
+                          <p:cTn id="4" fill="hold">
+                            <p:stCondLst>
+                              <p:cond delay="0"/>
+                            </p:stCondLst>
+                            <p:childTnLst>
+                              <p:par>
+                                <p:cTn id="5" presetID="22" presetClass="entr" presetSubtype="4" fill="hold" grpId="0" nodeType="clickEffect">
+                                  <p:stCondLst>
+                                    <p:cond delay="0"/>
+                                  </p:stCondLst>
+                                  <p:childTnLst>
+                                    <p:set>
+                                      <p:cBhvr>
+                                        <p:cTn id="6" dur="1" fill="hold">
+                                          <p:stCondLst>
+                                            <p:cond delay="0"/>
+                                          </p:stCondLst>
+                                        </p:cTn>
+                                        <p:tgtEl>
+                                          <p:spTgt spid="9"/>
+                                        </p:tgtEl>
+                                        <p:attrNameLst>
+                                          <p:attrName>style.visibility</p:attrName>
+                                        </p:attrNameLst>
+                                      </p:cBhvr>
+                                      <p:to>
+                                        <p:strVal val="visible"/>
+                                      </p:to>
+                                    </p:set>
+                                    <p:animEffect transition="in" filter="wipe(down)">
+                                      <p:cBhvr>
+                                        <p:cTn id="7" dur="500"/>
+                                        <p:tgtEl>
+                                          <p:spTgt spid="9"/>
+                                        </p:tgtEl>
+                                      </p:cBhvr>
+                                    </p:animEffect>
+                                  </p:childTnLst>
+                                </p:cTn>
+                              </p:par>
+                              <p:par>
+                                <p:cTn id="8" presetID="22" presetClass="entr" presetSubtype="4" fill="hold" nodeType="withEffect">
+                                  <p:stCondLst>
+                                    <p:cond delay="0"/>
+                                  </p:stCondLst>
+                                  <p:childTnLst>
+                                    <p:set>
+                                      <p:cBhvr>
+                                        <p:cTn id="9" dur="1" fill="hold">
+                                          <p:stCondLst>
+                                            <p:cond delay="0"/>
+                                          </p:stCondLst>
+                                        </p:cTn>
+                                        <p:tgtEl>
+                                          <p:spTgt spid="7"/>
+                                        </p:tgtEl>
+                                        <p:attrNameLst>
+                                          <p:attrName>style.visibility</p:attrName>
+                                        </p:attrNameLst>
+                                      </p:cBhvr>
+                                      <p:to>
+                                        <p:strVal val="visible"/>
+                                      </p:to>
+                                    </p:set>
+                                    <p:animEffect transition="in" filter="wipe(down)">
+                                      <p:cBhvr>
+                                        <p:cTn id="10" dur="500"/>
+                                        <p:tgtEl>
+                                          <p:spTgt spid="7"/>
+                                        </p:tgtEl>
+                                      </p:cBhvr>
+                                    </p:animEffect>
+                                  </p:childTnLst>
+                                </p:cTn>
+                              </p:par>
+                            </p:childTnLst>
+                          </p:cTn>
+                        </p:par>
+                      </p:childTnLst>
+                    </p:cTn>
+                  </p:par>
+                </p:childTnLst>
+              </p:cTn>
+              <p:prevCondLst>
+                <p:cond evt="onPrev" delay="0">
+                  <p:tgtEl>
+                    <p:sldTgt/>
+                  </p:tgtEl>
+                </p:cond>
+              </p:prevCondLst>
+              <p:nextCondLst>
+                <p:cond evt="onNext" delay="0">
+                  <p:tgtEl>
+                    <p:sldTgt/>
+                  </p:tgtEl>
+                </p:cond>
+              </p:nextCondLst>
+            </p:seq>
+          </p:childTnLst>
+        </p:cTn>
+      </p:par>
+    </p:tnLst>
+    <p:bldLst>
+      <p:bldP spid="9" grpId="0"/>
+    </p:bldLst>
+  </p:timing>
 </p:sld>
 </file>
 
@@ -5463,40 +5584,6 @@
           </a:p>
         </p:txBody>
       </p:sp>
-      <p:pic>
-        <p:nvPicPr>
-          <p:cNvPr id="7" name="Picture 6" descr="A graph showing the different seasons&#10;&#10;Description automatically generated with medium confidence">
-            <a:extLst>
-              <a:ext uri="{FF2B5EF4-FFF2-40B4-BE49-F238E27FC236}">
-                <a16:creationId xmlns:a16="http://schemas.microsoft.com/office/drawing/2014/main" id="{05CD10A7-9769-4AFC-A104-4A6D6802BEDE}"/>
-              </a:ext>
-            </a:extLst>
-          </p:cNvPr>
-          <p:cNvPicPr/>
-          <p:nvPr/>
-        </p:nvPicPr>
-        <p:blipFill>
-          <a:blip r:embed="rId2">
-            <a:extLst>
-              <a:ext uri="{28A0092B-C50C-407E-A947-70E740481C1C}">
-                <a14:useLocalDpi xmlns:a14="http://schemas.microsoft.com/office/drawing/2010/main" val="0"/>
-              </a:ext>
-            </a:extLst>
-          </a:blip>
-          <a:stretch>
-            <a:fillRect/>
-          </a:stretch>
-        </p:blipFill>
-        <p:spPr>
-          <a:xfrm>
-            <a:off x="1408271" y="1828800"/>
-            <a:ext cx="6327458" cy="3783965"/>
-          </a:xfrm>
-          <a:prstGeom prst="rect">
-            <a:avLst/>
-          </a:prstGeom>
-        </p:spPr>
-      </p:pic>
       <p:sp>
         <p:nvSpPr>
           <p:cNvPr id="9" name="TextBox 8">
@@ -5531,14 +5618,142 @@
               </a:spcAft>
             </a:pPr>
             <a:r>
-              <a:rPr lang="en-US" sz="1800" i="1">
+              <a:rPr lang="en-US" sz="1800" i="1" dirty="0" err="1">
                 <a:effectLst/>
                 <a:latin typeface="Times New Roman" panose="02020603050405020304" pitchFamily="18" charset="0"/>
                 <a:ea typeface="Times New Roman" panose="02020603050405020304" pitchFamily="18" charset="0"/>
               </a:rPr>
-              <a:t>Biểu đồ phân phối giá trị của thuộc tính season</a:t>
-            </a:r>
-            <a:endParaRPr lang="en-US" sz="1050" i="1">
+              <a:t>Biểu</a:t>
+            </a:r>
+            <a:r>
+              <a:rPr lang="en-US" sz="1800" i="1" dirty="0">
+                <a:effectLst/>
+                <a:latin typeface="Times New Roman" panose="02020603050405020304" pitchFamily="18" charset="0"/>
+                <a:ea typeface="Times New Roman" panose="02020603050405020304" pitchFamily="18" charset="0"/>
+              </a:rPr>
+              <a:t> </a:t>
+            </a:r>
+            <a:r>
+              <a:rPr lang="en-US" sz="1800" i="1" dirty="0" err="1">
+                <a:effectLst/>
+                <a:latin typeface="Times New Roman" panose="02020603050405020304" pitchFamily="18" charset="0"/>
+                <a:ea typeface="Times New Roman" panose="02020603050405020304" pitchFamily="18" charset="0"/>
+              </a:rPr>
+              <a:t>đồ</a:t>
+            </a:r>
+            <a:r>
+              <a:rPr lang="en-US" sz="1800" i="1" dirty="0">
+                <a:effectLst/>
+                <a:latin typeface="Times New Roman" panose="02020603050405020304" pitchFamily="18" charset="0"/>
+                <a:ea typeface="Times New Roman" panose="02020603050405020304" pitchFamily="18" charset="0"/>
+              </a:rPr>
+              <a:t> </a:t>
+            </a:r>
+            <a:r>
+              <a:rPr lang="en-US" sz="1800" i="1" dirty="0" err="1">
+                <a:effectLst/>
+                <a:latin typeface="Times New Roman" panose="02020603050405020304" pitchFamily="18" charset="0"/>
+                <a:ea typeface="Times New Roman" panose="02020603050405020304" pitchFamily="18" charset="0"/>
+              </a:rPr>
+              <a:t>phân</a:t>
+            </a:r>
+            <a:r>
+              <a:rPr lang="en-US" sz="1800" i="1" dirty="0">
+                <a:effectLst/>
+                <a:latin typeface="Times New Roman" panose="02020603050405020304" pitchFamily="18" charset="0"/>
+                <a:ea typeface="Times New Roman" panose="02020603050405020304" pitchFamily="18" charset="0"/>
+              </a:rPr>
+              <a:t> </a:t>
+            </a:r>
+            <a:r>
+              <a:rPr lang="en-US" sz="1800" i="1" dirty="0" err="1">
+                <a:effectLst/>
+                <a:latin typeface="Times New Roman" panose="02020603050405020304" pitchFamily="18" charset="0"/>
+                <a:ea typeface="Times New Roman" panose="02020603050405020304" pitchFamily="18" charset="0"/>
+              </a:rPr>
+              <a:t>phối</a:t>
+            </a:r>
+            <a:r>
+              <a:rPr lang="en-US" sz="1800" i="1" dirty="0">
+                <a:effectLst/>
+                <a:latin typeface="Times New Roman" panose="02020603050405020304" pitchFamily="18" charset="0"/>
+                <a:ea typeface="Times New Roman" panose="02020603050405020304" pitchFamily="18" charset="0"/>
+              </a:rPr>
+              <a:t> </a:t>
+            </a:r>
+            <a:r>
+              <a:rPr lang="en-US" sz="1800" i="1" dirty="0" err="1">
+                <a:effectLst/>
+                <a:latin typeface="Times New Roman" panose="02020603050405020304" pitchFamily="18" charset="0"/>
+                <a:ea typeface="Times New Roman" panose="02020603050405020304" pitchFamily="18" charset="0"/>
+              </a:rPr>
+              <a:t>giá</a:t>
+            </a:r>
+            <a:r>
+              <a:rPr lang="en-US" sz="1800" i="1" dirty="0">
+                <a:effectLst/>
+                <a:latin typeface="Times New Roman" panose="02020603050405020304" pitchFamily="18" charset="0"/>
+                <a:ea typeface="Times New Roman" panose="02020603050405020304" pitchFamily="18" charset="0"/>
+              </a:rPr>
+              <a:t> </a:t>
+            </a:r>
+            <a:r>
+              <a:rPr lang="en-US" sz="1800" i="1" dirty="0" err="1">
+                <a:effectLst/>
+                <a:latin typeface="Times New Roman" panose="02020603050405020304" pitchFamily="18" charset="0"/>
+                <a:ea typeface="Times New Roman" panose="02020603050405020304" pitchFamily="18" charset="0"/>
+              </a:rPr>
+              <a:t>trị</a:t>
+            </a:r>
+            <a:r>
+              <a:rPr lang="en-US" sz="1800" i="1" dirty="0">
+                <a:effectLst/>
+                <a:latin typeface="Times New Roman" panose="02020603050405020304" pitchFamily="18" charset="0"/>
+                <a:ea typeface="Times New Roman" panose="02020603050405020304" pitchFamily="18" charset="0"/>
+              </a:rPr>
+              <a:t> </a:t>
+            </a:r>
+            <a:r>
+              <a:rPr lang="en-US" sz="1800" i="1" dirty="0" err="1">
+                <a:effectLst/>
+                <a:latin typeface="Times New Roman" panose="02020603050405020304" pitchFamily="18" charset="0"/>
+                <a:ea typeface="Times New Roman" panose="02020603050405020304" pitchFamily="18" charset="0"/>
+              </a:rPr>
+              <a:t>của</a:t>
+            </a:r>
+            <a:r>
+              <a:rPr lang="en-US" sz="1800" i="1" dirty="0">
+                <a:effectLst/>
+                <a:latin typeface="Times New Roman" panose="02020603050405020304" pitchFamily="18" charset="0"/>
+                <a:ea typeface="Times New Roman" panose="02020603050405020304" pitchFamily="18" charset="0"/>
+              </a:rPr>
+              <a:t> </a:t>
+            </a:r>
+            <a:r>
+              <a:rPr lang="en-US" sz="1800" i="1" dirty="0" err="1">
+                <a:effectLst/>
+                <a:latin typeface="Times New Roman" panose="02020603050405020304" pitchFamily="18" charset="0"/>
+                <a:ea typeface="Times New Roman" panose="02020603050405020304" pitchFamily="18" charset="0"/>
+              </a:rPr>
+              <a:t>thuộc</a:t>
+            </a:r>
+            <a:r>
+              <a:rPr lang="en-US" sz="1800" i="1" dirty="0">
+                <a:effectLst/>
+                <a:latin typeface="Times New Roman" panose="02020603050405020304" pitchFamily="18" charset="0"/>
+                <a:ea typeface="Times New Roman" panose="02020603050405020304" pitchFamily="18" charset="0"/>
+              </a:rPr>
+              <a:t> </a:t>
+            </a:r>
+            <a:r>
+              <a:rPr lang="en-US" sz="1800" i="1" dirty="0" err="1">
+                <a:effectLst/>
+                <a:latin typeface="Times New Roman" panose="02020603050405020304" pitchFamily="18" charset="0"/>
+                <a:ea typeface="Times New Roman" panose="02020603050405020304" pitchFamily="18" charset="0"/>
+              </a:rPr>
+              <a:t>tính</a:t>
+            </a:r>
+            <a:endParaRPr lang="en-US" sz="1050" i="1" dirty="0">
               <a:effectLst/>
               <a:latin typeface="Times New Roman" panose="02020603050405020304" pitchFamily="18" charset="0"/>
               <a:ea typeface="Times New Roman" panose="02020603050405020304" pitchFamily="18" charset="0"/>
@@ -5546,6 +5761,42 @@
           </a:p>
         </p:txBody>
       </p:sp>
+      <p:pic>
+        <p:nvPicPr>
+          <p:cNvPr id="8" name="Picture 7" descr="A group of graphs showing different types of data&#10;&#10;Description automatically generated with medium confidence">
+            <a:extLst>
+              <a:ext uri="{FF2B5EF4-FFF2-40B4-BE49-F238E27FC236}">
+                <a16:creationId xmlns:a16="http://schemas.microsoft.com/office/drawing/2014/main" id="{8554B265-6E22-D199-CE85-F76BC258517E}"/>
+              </a:ext>
+            </a:extLst>
+          </p:cNvPr>
+          <p:cNvPicPr>
+            <a:picLocks noChangeAspect="1"/>
+          </p:cNvPicPr>
+          <p:nvPr/>
+        </p:nvPicPr>
+        <p:blipFill>
+          <a:blip r:embed="rId2">
+            <a:extLst>
+              <a:ext uri="{28A0092B-C50C-407E-A947-70E740481C1C}">
+                <a14:useLocalDpi xmlns:a14="http://schemas.microsoft.com/office/drawing/2010/main" val="0"/>
+              </a:ext>
+            </a:extLst>
+          </a:blip>
+          <a:stretch>
+            <a:fillRect/>
+          </a:stretch>
+        </p:blipFill>
+        <p:spPr>
+          <a:xfrm>
+            <a:off x="914400" y="1676400"/>
+            <a:ext cx="7924800" cy="3813853"/>
+          </a:xfrm>
+          <a:prstGeom prst="rect">
+            <a:avLst/>
+          </a:prstGeom>
+        </p:spPr>
+      </p:pic>
     </p:spTree>
     <p:extLst>
       <p:ext uri="{BB962C8B-B14F-4D97-AF65-F5344CB8AC3E}">
@@ -5556,6 +5807,127 @@
   <p:clrMapOvr>
     <a:masterClrMapping/>
   </p:clrMapOvr>
+  <p:timing>
+    <p:tnLst>
+      <p:par>
+        <p:cTn id="1" dur="indefinite" restart="never" nodeType="tmRoot">
+          <p:childTnLst>
+            <p:seq concurrent="1" nextAc="seek">
+              <p:cTn id="2" dur="indefinite" nodeType="mainSeq">
+                <p:childTnLst>
+                  <p:par>
+                    <p:cTn id="3" fill="hold">
+                      <p:stCondLst>
+                        <p:cond delay="indefinite"/>
+                      </p:stCondLst>
+                      <p:childTnLst>
+                        <p:par>
+                          <p:cTn id="4" fill="hold">
+                            <p:stCondLst>
+                              <p:cond delay="0"/>
+                            </p:stCondLst>
+                            <p:childTnLst>
+                              <p:par>
+                                <p:cTn id="5" presetID="22" presetClass="entr" presetSubtype="4" fill="hold" nodeType="clickEffect">
+                                  <p:stCondLst>
+                                    <p:cond delay="0"/>
+                                  </p:stCondLst>
+                                  <p:childTnLst>
+                                    <p:set>
+                                      <p:cBhvr>
+                                        <p:cTn id="6" dur="1" fill="hold">
+                                          <p:stCondLst>
+                                            <p:cond delay="0"/>
+                                          </p:stCondLst>
+                                        </p:cTn>
+                                        <p:tgtEl>
+                                          <p:spTgt spid="8"/>
+                                        </p:tgtEl>
+                                        <p:attrNameLst>
+                                          <p:attrName>style.visibility</p:attrName>
+                                        </p:attrNameLst>
+                                      </p:cBhvr>
+                                      <p:to>
+                                        <p:strVal val="visible"/>
+                                      </p:to>
+                                    </p:set>
+                                    <p:animEffect transition="in" filter="wipe(down)">
+                                      <p:cBhvr>
+                                        <p:cTn id="7" dur="500"/>
+                                        <p:tgtEl>
+                                          <p:spTgt spid="8"/>
+                                        </p:tgtEl>
+                                      </p:cBhvr>
+                                    </p:animEffect>
+                                  </p:childTnLst>
+                                </p:cTn>
+                              </p:par>
+                              <p:par>
+                                <p:cTn id="8" presetID="22" presetClass="entr" presetSubtype="4" fill="hold" grpId="0" nodeType="withEffect">
+                                  <p:stCondLst>
+                                    <p:cond delay="0"/>
+                                  </p:stCondLst>
+                                  <p:childTnLst>
+                                    <p:set>
+                                      <p:cBhvr>
+                                        <p:cTn id="9" dur="1" fill="hold">
+                                          <p:stCondLst>
+                                            <p:cond delay="0"/>
+                                          </p:stCondLst>
+                                        </p:cTn>
+                                        <p:tgtEl>
+                                          <p:spTgt spid="9"/>
+                                        </p:tgtEl>
+                                        <p:attrNameLst>
+                                          <p:attrName>style.visibility</p:attrName>
+                                        </p:attrNameLst>
+                                      </p:cBhvr>
+                                      <p:to>
+                                        <p:strVal val="visible"/>
+                                      </p:to>
+                                    </p:set>
+                                    <p:animEffect transition="in" filter="wipe(down)">
+                                      <p:cBhvr>
+                                        <p:cTn id="10" dur="500"/>
+                                        <p:tgtEl>
+                                          <p:spTgt spid="9"/>
+                                        </p:tgtEl>
+                                      </p:cBhvr>
+                                    </p:animEffect>
+                                  </p:childTnLst>
+                                </p:cTn>
+                              </p:par>
+                            </p:childTnLst>
+                          </p:cTn>
+                        </p:par>
+                      </p:childTnLst>
+                    </p:cTn>
+                  </p:par>
+                </p:childTnLst>
+              </p:cTn>
+              <p:prevCondLst>
+                <p:cond evt="onPrev" delay="0">
+                  <p:tgtEl>
+                    <p:sldTgt/>
+                  </p:tgtEl>
+                </p:cond>
+              </p:prevCondLst>
+              <p:nextCondLst>
+                <p:cond evt="onNext" delay="0">
+                  <p:tgtEl>
+                    <p:sldTgt/>
+                  </p:tgtEl>
+                </p:cond>
+              </p:nextCondLst>
+            </p:seq>
+          </p:childTnLst>
+        </p:cTn>
+      </p:par>
+    </p:tnLst>
+    <p:bldLst>
+      <p:bldP spid="9" grpId="0"/>
+    </p:bldLst>
+  </p:timing>
 </p:sld>
 </file>
 
@@ -5635,16 +6007,186 @@
           </a:p>
         </p:txBody>
       </p:sp>
+      <p:sp>
+        <p:nvSpPr>
+          <p:cNvPr id="10" name="TextBox 9">
+            <a:extLst>
+              <a:ext uri="{FF2B5EF4-FFF2-40B4-BE49-F238E27FC236}">
+                <a16:creationId xmlns:a16="http://schemas.microsoft.com/office/drawing/2014/main" id="{41929B8B-ED99-45E5-BEC6-CB3D919C35DA}"/>
+              </a:ext>
+            </a:extLst>
+          </p:cNvPr>
+          <p:cNvSpPr txBox="1"/>
+          <p:nvPr/>
+        </p:nvSpPr>
+        <p:spPr>
+          <a:xfrm>
+            <a:off x="2971800" y="5771299"/>
+            <a:ext cx="4876800" cy="369332"/>
+          </a:xfrm>
+          <a:prstGeom prst="rect">
+            <a:avLst/>
+          </a:prstGeom>
+          <a:noFill/>
+        </p:spPr>
+        <p:txBody>
+          <a:bodyPr wrap="square">
+            <a:spAutoFit/>
+          </a:bodyPr>
+          <a:lstStyle/>
+          <a:p>
+            <a:r>
+              <a:rPr lang="en-US" sz="1800" i="1" dirty="0" err="1">
+                <a:effectLst/>
+                <a:latin typeface="Times New Roman" panose="02020603050405020304" pitchFamily="18" charset="0"/>
+                <a:ea typeface="Times New Roman" panose="02020603050405020304" pitchFamily="18" charset="0"/>
+              </a:rPr>
+              <a:t>Biểu</a:t>
+            </a:r>
+            <a:r>
+              <a:rPr lang="en-US" sz="1800" i="1" dirty="0">
+                <a:effectLst/>
+                <a:latin typeface="Times New Roman" panose="02020603050405020304" pitchFamily="18" charset="0"/>
+                <a:ea typeface="Times New Roman" panose="02020603050405020304" pitchFamily="18" charset="0"/>
+              </a:rPr>
+              <a:t> </a:t>
+            </a:r>
+            <a:r>
+              <a:rPr lang="en-US" sz="1800" i="1" dirty="0" err="1">
+                <a:effectLst/>
+                <a:latin typeface="Times New Roman" panose="02020603050405020304" pitchFamily="18" charset="0"/>
+                <a:ea typeface="Times New Roman" panose="02020603050405020304" pitchFamily="18" charset="0"/>
+              </a:rPr>
+              <a:t>đồ</a:t>
+            </a:r>
+            <a:r>
+              <a:rPr lang="en-US" sz="1800" i="1" dirty="0">
+                <a:effectLst/>
+                <a:latin typeface="Times New Roman" panose="02020603050405020304" pitchFamily="18" charset="0"/>
+                <a:ea typeface="Times New Roman" panose="02020603050405020304" pitchFamily="18" charset="0"/>
+              </a:rPr>
+              <a:t> </a:t>
+            </a:r>
+            <a:r>
+              <a:rPr lang="en-US" sz="1800" i="1" dirty="0" err="1">
+                <a:effectLst/>
+                <a:latin typeface="Times New Roman" panose="02020603050405020304" pitchFamily="18" charset="0"/>
+                <a:ea typeface="Times New Roman" panose="02020603050405020304" pitchFamily="18" charset="0"/>
+              </a:rPr>
+              <a:t>phân</a:t>
+            </a:r>
+            <a:r>
+              <a:rPr lang="en-US" sz="1800" i="1" dirty="0">
+                <a:effectLst/>
+                <a:latin typeface="Times New Roman" panose="02020603050405020304" pitchFamily="18" charset="0"/>
+                <a:ea typeface="Times New Roman" panose="02020603050405020304" pitchFamily="18" charset="0"/>
+              </a:rPr>
+              <a:t> </a:t>
+            </a:r>
+            <a:r>
+              <a:rPr lang="en-US" sz="1800" i="1" dirty="0" err="1">
+                <a:effectLst/>
+                <a:latin typeface="Times New Roman" panose="02020603050405020304" pitchFamily="18" charset="0"/>
+                <a:ea typeface="Times New Roman" panose="02020603050405020304" pitchFamily="18" charset="0"/>
+              </a:rPr>
+              <a:t>phối</a:t>
+            </a:r>
+            <a:r>
+              <a:rPr lang="en-US" sz="1800" i="1" dirty="0">
+                <a:effectLst/>
+                <a:latin typeface="Times New Roman" panose="02020603050405020304" pitchFamily="18" charset="0"/>
+                <a:ea typeface="Times New Roman" panose="02020603050405020304" pitchFamily="18" charset="0"/>
+              </a:rPr>
+              <a:t> </a:t>
+            </a:r>
+            <a:r>
+              <a:rPr lang="en-US" sz="1800" i="1" dirty="0" err="1">
+                <a:effectLst/>
+                <a:latin typeface="Times New Roman" panose="02020603050405020304" pitchFamily="18" charset="0"/>
+                <a:ea typeface="Times New Roman" panose="02020603050405020304" pitchFamily="18" charset="0"/>
+              </a:rPr>
+              <a:t>giá</a:t>
+            </a:r>
+            <a:r>
+              <a:rPr lang="en-US" sz="1800" i="1" dirty="0">
+                <a:effectLst/>
+                <a:latin typeface="Times New Roman" panose="02020603050405020304" pitchFamily="18" charset="0"/>
+                <a:ea typeface="Times New Roman" panose="02020603050405020304" pitchFamily="18" charset="0"/>
+              </a:rPr>
+              <a:t> </a:t>
+            </a:r>
+            <a:r>
+              <a:rPr lang="en-US" sz="1800" i="1" dirty="0" err="1">
+                <a:effectLst/>
+                <a:latin typeface="Times New Roman" panose="02020603050405020304" pitchFamily="18" charset="0"/>
+                <a:ea typeface="Times New Roman" panose="02020603050405020304" pitchFamily="18" charset="0"/>
+              </a:rPr>
+              <a:t>trị</a:t>
+            </a:r>
+            <a:r>
+              <a:rPr lang="en-US" sz="1800" i="1" dirty="0">
+                <a:effectLst/>
+                <a:latin typeface="Times New Roman" panose="02020603050405020304" pitchFamily="18" charset="0"/>
+                <a:ea typeface="Times New Roman" panose="02020603050405020304" pitchFamily="18" charset="0"/>
+              </a:rPr>
+              <a:t> </a:t>
+            </a:r>
+            <a:r>
+              <a:rPr lang="en-US" sz="1800" i="1" dirty="0" err="1">
+                <a:effectLst/>
+                <a:latin typeface="Times New Roman" panose="02020603050405020304" pitchFamily="18" charset="0"/>
+                <a:ea typeface="Times New Roman" panose="02020603050405020304" pitchFamily="18" charset="0"/>
+              </a:rPr>
+              <a:t>của</a:t>
+            </a:r>
+            <a:r>
+              <a:rPr lang="en-US" sz="1800" i="1" dirty="0">
+                <a:effectLst/>
+                <a:latin typeface="Times New Roman" panose="02020603050405020304" pitchFamily="18" charset="0"/>
+                <a:ea typeface="Times New Roman" panose="02020603050405020304" pitchFamily="18" charset="0"/>
+              </a:rPr>
+              <a:t> </a:t>
+            </a:r>
+            <a:r>
+              <a:rPr lang="en-US" sz="1800" i="1" dirty="0" err="1">
+                <a:effectLst/>
+                <a:latin typeface="Times New Roman" panose="02020603050405020304" pitchFamily="18" charset="0"/>
+                <a:ea typeface="Times New Roman" panose="02020603050405020304" pitchFamily="18" charset="0"/>
+              </a:rPr>
+              <a:t>thuộc</a:t>
+            </a:r>
+            <a:r>
+              <a:rPr lang="en-US" sz="1800" i="1" dirty="0">
+                <a:effectLst/>
+                <a:latin typeface="Times New Roman" panose="02020603050405020304" pitchFamily="18" charset="0"/>
+                <a:ea typeface="Times New Roman" panose="02020603050405020304" pitchFamily="18" charset="0"/>
+              </a:rPr>
+              <a:t> </a:t>
+            </a:r>
+            <a:r>
+              <a:rPr lang="en-US" sz="1800" i="1" dirty="0" err="1">
+                <a:effectLst/>
+                <a:latin typeface="Times New Roman" panose="02020603050405020304" pitchFamily="18" charset="0"/>
+                <a:ea typeface="Times New Roman" panose="02020603050405020304" pitchFamily="18" charset="0"/>
+              </a:rPr>
+              <a:t>tính</a:t>
+            </a:r>
+            <a:endParaRPr lang="en-US" i="1" dirty="0"/>
+          </a:p>
+        </p:txBody>
+      </p:sp>
       <p:pic>
         <p:nvPicPr>
-          <p:cNvPr id="8" name="Picture 7" descr="A white rectangular object with black text&#10;&#10;Description automatically generated">
-            <a:extLst>
-              <a:ext uri="{FF2B5EF4-FFF2-40B4-BE49-F238E27FC236}">
-                <a16:creationId xmlns:a16="http://schemas.microsoft.com/office/drawing/2014/main" id="{558D267C-7D1C-4F5B-A124-EF9CBE03C05E}"/>
-              </a:ext>
-            </a:extLst>
-          </p:cNvPr>
-          <p:cNvPicPr/>
+          <p:cNvPr id="5" name="Picture 4" descr="A graph of different types of data&#10;&#10;Description automatically generated with medium confidence">
+            <a:extLst>
+              <a:ext uri="{FF2B5EF4-FFF2-40B4-BE49-F238E27FC236}">
+                <a16:creationId xmlns:a16="http://schemas.microsoft.com/office/drawing/2014/main" id="{FA29CA9D-BA45-232D-4526-B48788D24C38}"/>
+              </a:ext>
+            </a:extLst>
+          </p:cNvPr>
+          <p:cNvPicPr>
+            <a:picLocks noChangeAspect="1"/>
+          </p:cNvPicPr>
           <p:nvPr/>
         </p:nvPicPr>
         <p:blipFill>
@@ -5661,54 +6203,14 @@
         </p:blipFill>
         <p:spPr>
           <a:xfrm>
-            <a:off x="1479073" y="1828800"/>
-            <a:ext cx="6185853" cy="3492818"/>
+            <a:off x="1379378" y="1503972"/>
+            <a:ext cx="7147244" cy="4001379"/>
           </a:xfrm>
           <a:prstGeom prst="rect">
             <a:avLst/>
           </a:prstGeom>
         </p:spPr>
       </p:pic>
-      <p:sp>
-        <p:nvSpPr>
-          <p:cNvPr id="10" name="TextBox 9">
-            <a:extLst>
-              <a:ext uri="{FF2B5EF4-FFF2-40B4-BE49-F238E27FC236}">
-                <a16:creationId xmlns:a16="http://schemas.microsoft.com/office/drawing/2014/main" id="{41929B8B-ED99-45E5-BEC6-CB3D919C35DA}"/>
-              </a:ext>
-            </a:extLst>
-          </p:cNvPr>
-          <p:cNvSpPr txBox="1"/>
-          <p:nvPr/>
-        </p:nvSpPr>
-        <p:spPr>
-          <a:xfrm>
-            <a:off x="2514600" y="5534898"/>
-            <a:ext cx="4876800" cy="369332"/>
-          </a:xfrm>
-          <a:prstGeom prst="rect">
-            <a:avLst/>
-          </a:prstGeom>
-          <a:noFill/>
-        </p:spPr>
-        <p:txBody>
-          <a:bodyPr wrap="square">
-            <a:spAutoFit/>
-          </a:bodyPr>
-          <a:lstStyle/>
-          <a:p>
-            <a:r>
-              <a:rPr lang="en-US" sz="1800" i="1">
-                <a:effectLst/>
-                <a:latin typeface="Times New Roman" panose="02020603050405020304" pitchFamily="18" charset="0"/>
-                <a:ea typeface="Times New Roman" panose="02020603050405020304" pitchFamily="18" charset="0"/>
-              </a:rPr>
-              <a:t>Biểu đồ phân phối giá trị của thuộc tính holiday</a:t>
-            </a:r>
-            <a:endParaRPr lang="en-US" i="1"/>
-          </a:p>
-        </p:txBody>
-      </p:sp>
     </p:spTree>
     <p:extLst>
       <p:ext uri="{BB962C8B-B14F-4D97-AF65-F5344CB8AC3E}">
@@ -11801,16 +12303,56 @@
               <a:buNone/>
             </a:pPr>
             <a:r>
-              <a:rPr lang="en-US" sz="2800" b="1"/>
-              <a:t>Ý nghĩa của các đặc trưng:</a:t>
-            </a:r>
-            <a:endParaRPr lang="en-US"/>
+              <a:rPr lang="en-US" sz="2800" b="1" dirty="0"/>
+              <a:t>Ý </a:t>
+            </a:r>
+            <a:r>
+              <a:rPr lang="en-US" sz="2800" b="1" dirty="0" err="1"/>
+              <a:t>nghĩa</a:t>
+            </a:r>
+            <a:r>
+              <a:rPr lang="en-US" sz="2800" b="1" dirty="0"/>
+              <a:t> </a:t>
+            </a:r>
+            <a:r>
+              <a:rPr lang="en-US" sz="2800" b="1" dirty="0" err="1"/>
+              <a:t>của</a:t>
+            </a:r>
+            <a:r>
+              <a:rPr lang="en-US" sz="2800" b="1" dirty="0"/>
+              <a:t> </a:t>
+            </a:r>
+            <a:r>
+              <a:rPr lang="en-US" sz="2800" b="1" dirty="0" err="1"/>
+              <a:t>các</a:t>
+            </a:r>
+            <a:r>
+              <a:rPr lang="en-US" sz="2800" b="1" dirty="0"/>
+              <a:t> </a:t>
+            </a:r>
+            <a:r>
+              <a:rPr lang="en-US" sz="2800" b="1" dirty="0" err="1"/>
+              <a:t>đặc</a:t>
+            </a:r>
+            <a:r>
+              <a:rPr lang="en-US" sz="2800" b="1" dirty="0"/>
+              <a:t> </a:t>
+            </a:r>
+            <a:r>
+              <a:rPr lang="en-US" sz="2800" b="1" dirty="0" err="1"/>
+              <a:t>trưng</a:t>
+            </a:r>
+            <a:r>
+              <a:rPr lang="en-US" sz="2800" b="1" dirty="0"/>
+              <a:t>:</a:t>
+            </a:r>
+            <a:endParaRPr lang="en-US" dirty="0"/>
           </a:p>
           <a:p>
             <a:pPr marL="0" indent="0">
               <a:buNone/>
             </a:pPr>
-            <a:endParaRPr lang="en-US"/>
+            <a:endParaRPr lang="en-US" dirty="0"/>
           </a:p>
           <a:p>
             <a:pPr marL="0" indent="0">
@@ -11819,7 +12361,7 @@
               </a:lnSpc>
               <a:buNone/>
             </a:pPr>
-            <a:endParaRPr lang="en-US" sz="2800"/>
+            <a:endParaRPr lang="en-US" sz="2800" dirty="0"/>
           </a:p>
         </p:txBody>
       </p:sp>
@@ -11868,7 +12410,7 @@
           <p:nvPr>
             <p:extLst>
               <p:ext uri="{D42A27DB-BD31-4B8C-83A1-F6EECF244321}">
-                <p14:modId xmlns:p14="http://schemas.microsoft.com/office/powerpoint/2010/main" val="3956523722"/>
+                <p14:modId xmlns:p14="http://schemas.microsoft.com/office/powerpoint/2010/main" val="2010331452"/>
               </p:ext>
             </p:extLst>
           </p:nvPr>
@@ -11950,11 +12492,11 @@
                     <a:p>
                       <a:pPr algn="just"/>
                       <a:r>
-                        <a:rPr lang="en-US"/>
+                        <a:rPr lang="en-US" dirty="0"/>
                         <a:t>1. </a:t>
                       </a:r>
                       <a:r>
-                        <a:rPr lang="en-US" sz="1800" kern="1200">
+                        <a:rPr lang="en-US" sz="1800" kern="1200" dirty="0">
                           <a:solidFill>
                             <a:schemeClr val="dk1"/>
                           </a:solidFill>
@@ -11965,7 +12507,7 @@
                         </a:rPr>
                         <a:t>datetime</a:t>
                       </a:r>
-                      <a:endParaRPr lang="en-US"/>
+                      <a:endParaRPr lang="en-US" dirty="0"/>
                     </a:p>
                   </a:txBody>
                   <a:tcPr anchor="ctr"/>
@@ -11993,7 +12535,7 @@
                         <a:defRPr/>
                       </a:pPr>
                       <a:r>
-                        <a:rPr lang="en-US" sz="1800" kern="1200">
+                        <a:rPr lang="en-US" sz="1800" kern="1200" dirty="0">
                           <a:solidFill>
                             <a:schemeClr val="dk1"/>
                           </a:solidFill>
@@ -12002,8 +12544,173 @@
                           <a:ea typeface="+mn-ea"/>
                           <a:cs typeface="+mn-cs"/>
                         </a:rPr>
-                        <a:t>Cho biết thời gian theo dịnh dạng "%m/%d/%Y %H:%M:%hS</a:t>
+                        <a:t>Cho </a:t>
                       </a:r>
+                      <a:r>
+                        <a:rPr lang="en-US" sz="1800" kern="1200" dirty="0" err="1">
+                          <a:solidFill>
+                            <a:schemeClr val="dk1"/>
+                          </a:solidFill>
+                          <a:effectLst/>
+                          <a:latin typeface="+mn-lt"/>
+                          <a:ea typeface="+mn-ea"/>
+                          <a:cs typeface="+mn-cs"/>
+                        </a:rPr>
+                        <a:t>biết</a:t>
+                      </a:r>
+                      <a:r>
+                        <a:rPr lang="en-US" sz="1800" kern="1200" dirty="0">
+                          <a:solidFill>
+                            <a:schemeClr val="dk1"/>
+                          </a:solidFill>
+                          <a:effectLst/>
+                          <a:latin typeface="+mn-lt"/>
+                          <a:ea typeface="+mn-ea"/>
+                          <a:cs typeface="+mn-cs"/>
+                        </a:rPr>
+                        <a:t> </a:t>
+                      </a:r>
+                      <a:r>
+                        <a:rPr lang="en-US" sz="1800" kern="1200" dirty="0" err="1">
+                          <a:solidFill>
+                            <a:schemeClr val="dk1"/>
+                          </a:solidFill>
+                          <a:effectLst/>
+                          <a:latin typeface="+mn-lt"/>
+                          <a:ea typeface="+mn-ea"/>
+                          <a:cs typeface="+mn-cs"/>
+                        </a:rPr>
+                        <a:t>thời</a:t>
+                      </a:r>
+                      <a:r>
+                        <a:rPr lang="en-US" sz="1800" kern="1200" dirty="0">
+                          <a:solidFill>
+                            <a:schemeClr val="dk1"/>
+                          </a:solidFill>
+                          <a:effectLst/>
+                          <a:latin typeface="+mn-lt"/>
+                          <a:ea typeface="+mn-ea"/>
+                          <a:cs typeface="+mn-cs"/>
+                        </a:rPr>
+                        <a:t> </a:t>
+                      </a:r>
+                      <a:r>
+                        <a:rPr lang="en-US" sz="1800" kern="1200" dirty="0" err="1">
+                          <a:solidFill>
+                            <a:schemeClr val="dk1"/>
+                          </a:solidFill>
+                          <a:effectLst/>
+                          <a:latin typeface="+mn-lt"/>
+                          <a:ea typeface="+mn-ea"/>
+                          <a:cs typeface="+mn-cs"/>
+                        </a:rPr>
+                        <a:t>gian</a:t>
+                      </a:r>
+                      <a:r>
+                        <a:rPr lang="en-US" sz="1800" kern="1200" dirty="0">
+                          <a:solidFill>
+                            <a:schemeClr val="dk1"/>
+                          </a:solidFill>
+                          <a:effectLst/>
+                          <a:latin typeface="+mn-lt"/>
+                          <a:ea typeface="+mn-ea"/>
+                          <a:cs typeface="+mn-cs"/>
+                        </a:rPr>
+                        <a:t> </a:t>
+                      </a:r>
+                      <a:r>
+                        <a:rPr lang="en-US" sz="1800" kern="1200" dirty="0" err="1">
+                          <a:solidFill>
+                            <a:schemeClr val="dk1"/>
+                          </a:solidFill>
+                          <a:effectLst/>
+                          <a:latin typeface="+mn-lt"/>
+                          <a:ea typeface="+mn-ea"/>
+                          <a:cs typeface="+mn-cs"/>
+                        </a:rPr>
+                        <a:t>theo</a:t>
+                      </a:r>
+                      <a:r>
+                        <a:rPr lang="en-US" sz="1800" kern="1200" dirty="0">
+                          <a:solidFill>
+                            <a:schemeClr val="dk1"/>
+                          </a:solidFill>
+                          <a:effectLst/>
+                          <a:latin typeface="+mn-lt"/>
+                          <a:ea typeface="+mn-ea"/>
+                          <a:cs typeface="+mn-cs"/>
+                        </a:rPr>
+                        <a:t> </a:t>
+                      </a:r>
+                      <a:r>
+                        <a:rPr lang="en-US" sz="1800" kern="1200" dirty="0" err="1">
+                          <a:solidFill>
+                            <a:schemeClr val="dk1"/>
+                          </a:solidFill>
+                          <a:effectLst/>
+                          <a:latin typeface="+mn-lt"/>
+                          <a:ea typeface="+mn-ea"/>
+                          <a:cs typeface="+mn-cs"/>
+                        </a:rPr>
+                        <a:t>dịnh</a:t>
+                      </a:r>
+                      <a:r>
+                        <a:rPr lang="en-US" sz="1800" kern="1200" dirty="0">
+                          <a:solidFill>
+                            <a:schemeClr val="dk1"/>
+                          </a:solidFill>
+                          <a:effectLst/>
+                          <a:latin typeface="+mn-lt"/>
+                          <a:ea typeface="+mn-ea"/>
+                          <a:cs typeface="+mn-cs"/>
+                        </a:rPr>
+                        <a:t> </a:t>
+                      </a:r>
+                      <a:r>
+                        <a:rPr lang="en-US" sz="1800" kern="1200" dirty="0" err="1">
+                          <a:solidFill>
+                            <a:schemeClr val="dk1"/>
+                          </a:solidFill>
+                          <a:effectLst/>
+                          <a:latin typeface="+mn-lt"/>
+                          <a:ea typeface="+mn-ea"/>
+                          <a:cs typeface="+mn-cs"/>
+                        </a:rPr>
+                        <a:t>dạng</a:t>
+                      </a:r>
+                      <a:r>
+                        <a:rPr lang="en-US" sz="1800" kern="1200" dirty="0">
+                          <a:solidFill>
+                            <a:schemeClr val="dk1"/>
+                          </a:solidFill>
+                          <a:effectLst/>
+                          <a:latin typeface="+mn-lt"/>
+                          <a:ea typeface="+mn-ea"/>
+                          <a:cs typeface="+mn-cs"/>
+                        </a:rPr>
+                        <a:t> %m/%d/%Y %H:%M:%</a:t>
+                      </a:r>
+                      <a:r>
+                        <a:rPr lang="en-US" sz="1800" kern="1200" dirty="0" err="1">
+                          <a:solidFill>
+                            <a:schemeClr val="dk1"/>
+                          </a:solidFill>
+                          <a:effectLst/>
+                          <a:latin typeface="+mn-lt"/>
+                          <a:ea typeface="+mn-ea"/>
+                          <a:cs typeface="+mn-cs"/>
+                        </a:rPr>
+                        <a:t>hS</a:t>
+                      </a:r>
+                      <a:endParaRPr lang="en-US" sz="1800" kern="1200" dirty="0">
+                        <a:solidFill>
+                          <a:schemeClr val="dk1"/>
+                        </a:solidFill>
+                        <a:effectLst/>
+                        <a:latin typeface="+mn-lt"/>
+                        <a:ea typeface="+mn-ea"/>
+                        <a:cs typeface="+mn-cs"/>
+                      </a:endParaRPr>
                     </a:p>
                   </a:txBody>
                   <a:tcPr anchor="ctr"/>
@@ -12022,11 +12729,11 @@
                     <a:p>
                       <a:pPr algn="just"/>
                       <a:r>
-                        <a:rPr lang="en-US"/>
+                        <a:rPr lang="en-US" dirty="0"/>
                         <a:t>2. </a:t>
                       </a:r>
                       <a:r>
-                        <a:rPr lang="en-US" sz="1800" kern="1200">
+                        <a:rPr lang="en-US" sz="1800" kern="1200" dirty="0">
                           <a:solidFill>
                             <a:schemeClr val="dk1"/>
                           </a:solidFill>
@@ -12037,7 +12744,7 @@
                         </a:rPr>
                         <a:t>season</a:t>
                       </a:r>
-                      <a:endParaRPr lang="en-US"/>
+                      <a:endParaRPr lang="en-US" dirty="0"/>
                     </a:p>
                   </a:txBody>
                   <a:tcPr anchor="ctr"/>
@@ -12253,7 +12960,7 @@
                         <a:defRPr/>
                       </a:pPr>
                       <a:r>
-                        <a:rPr lang="en-US" sz="1800" kern="1200">
+                        <a:rPr lang="en-US" sz="1800" kern="1200" dirty="0" err="1">
                           <a:solidFill>
                             <a:schemeClr val="dk1"/>
                           </a:solidFill>
@@ -12262,10 +12969,190 @@
                           <a:ea typeface="+mn-ea"/>
                           <a:cs typeface="+mn-cs"/>
                         </a:rPr>
-                        <a:t>Nhiệt độ thực tế tính theo độ Celsius (độ </a:t>
+                        <a:t>Nhiệt</a:t>
                       </a:r>
                       <a:r>
-                        <a:rPr lang="en-US" sz="1800" kern="1200">
+                        <a:rPr lang="en-US" sz="1800" kern="1200" dirty="0">
+                          <a:solidFill>
+                            <a:schemeClr val="dk1"/>
+                          </a:solidFill>
+                          <a:effectLst/>
+                          <a:latin typeface="+mn-lt"/>
+                          <a:ea typeface="+mn-ea"/>
+                          <a:cs typeface="+mn-cs"/>
+                        </a:rPr>
+                        <a:t> </a:t>
+                      </a:r>
+                      <a:r>
+                        <a:rPr lang="en-US" sz="1800" kern="1200" dirty="0" err="1">
+                          <a:solidFill>
+                            <a:schemeClr val="dk1"/>
+                          </a:solidFill>
+                          <a:effectLst/>
+                          <a:latin typeface="+mn-lt"/>
+                          <a:ea typeface="+mn-ea"/>
+                          <a:cs typeface="+mn-cs"/>
+                        </a:rPr>
+                        <a:t>độ</a:t>
+                      </a:r>
+                      <a:r>
+                        <a:rPr lang="en-US" sz="1800" kern="1200" dirty="0">
+                          <a:solidFill>
+                            <a:schemeClr val="dk1"/>
+                          </a:solidFill>
+                          <a:effectLst/>
+                          <a:latin typeface="+mn-lt"/>
+                          <a:ea typeface="+mn-ea"/>
+                          <a:cs typeface="+mn-cs"/>
+                        </a:rPr>
+                        <a:t> </a:t>
+                      </a:r>
+                      <a:r>
+                        <a:rPr lang="en-US" sz="1800" kern="1200" dirty="0" err="1">
+                          <a:solidFill>
+                            <a:schemeClr val="dk1"/>
+                          </a:solidFill>
+                          <a:effectLst/>
+                          <a:latin typeface="+mn-lt"/>
+                          <a:ea typeface="+mn-ea"/>
+                          <a:cs typeface="+mn-cs"/>
+                        </a:rPr>
+                        <a:t>thực</a:t>
+                      </a:r>
+                      <a:r>
+                        <a:rPr lang="en-US" sz="1800" kern="1200" dirty="0">
+                          <a:solidFill>
+                            <a:schemeClr val="dk1"/>
+                          </a:solidFill>
+                          <a:effectLst/>
+                          <a:latin typeface="+mn-lt"/>
+                          <a:ea typeface="+mn-ea"/>
+                          <a:cs typeface="+mn-cs"/>
+                        </a:rPr>
+                        <a:t> </a:t>
+                      </a:r>
+                      <a:r>
+                        <a:rPr lang="en-US" sz="1800" kern="1200" dirty="0" err="1">
+                          <a:solidFill>
+                            <a:schemeClr val="dk1"/>
+                          </a:solidFill>
+                          <a:effectLst/>
+                          <a:latin typeface="+mn-lt"/>
+                          <a:ea typeface="+mn-ea"/>
+                          <a:cs typeface="+mn-cs"/>
+                        </a:rPr>
+                        <a:t>tế</a:t>
+                      </a:r>
+                      <a:r>
+                        <a:rPr lang="en-US" sz="1800" kern="1200" dirty="0">
+                          <a:solidFill>
+                            <a:schemeClr val="dk1"/>
+                          </a:solidFill>
+                          <a:effectLst/>
+                          <a:latin typeface="+mn-lt"/>
+                          <a:ea typeface="+mn-ea"/>
+                          <a:cs typeface="+mn-cs"/>
+                        </a:rPr>
+                        <a:t> </a:t>
+                      </a:r>
+                      <a:r>
+                        <a:rPr lang="en-US" sz="1800" kern="1200" dirty="0" err="1">
+                          <a:solidFill>
+                            <a:schemeClr val="dk1"/>
+                          </a:solidFill>
+                          <a:effectLst/>
+                          <a:latin typeface="+mn-lt"/>
+                          <a:ea typeface="+mn-ea"/>
+                          <a:cs typeface="+mn-cs"/>
+                        </a:rPr>
+                        <a:t>tính</a:t>
+                      </a:r>
+                      <a:r>
+                        <a:rPr lang="en-US" sz="1800" kern="1200" dirty="0">
+                          <a:solidFill>
+                            <a:schemeClr val="dk1"/>
+                          </a:solidFill>
+                          <a:effectLst/>
+                          <a:latin typeface="+mn-lt"/>
+                          <a:ea typeface="+mn-ea"/>
+                          <a:cs typeface="+mn-cs"/>
+                        </a:rPr>
+                        <a:t> </a:t>
+                      </a:r>
+                      <a:r>
+                        <a:rPr lang="en-US" sz="1800" kern="1200" dirty="0" err="1">
+                          <a:solidFill>
+                            <a:schemeClr val="dk1"/>
+                          </a:solidFill>
+                          <a:effectLst/>
+                          <a:latin typeface="+mn-lt"/>
+                          <a:ea typeface="+mn-ea"/>
+                          <a:cs typeface="+mn-cs"/>
+                        </a:rPr>
+                        <a:t>theo</a:t>
+                      </a:r>
+                      <a:r>
+                        <a:rPr lang="en-US" sz="1800" kern="1200" dirty="0">
+                          <a:solidFill>
+                            <a:schemeClr val="dk1"/>
+                          </a:solidFill>
+                          <a:effectLst/>
+                          <a:latin typeface="+mn-lt"/>
+                          <a:ea typeface="+mn-ea"/>
+                          <a:cs typeface="+mn-cs"/>
+                        </a:rPr>
+                        <a:t> </a:t>
+                      </a:r>
+                      <a:r>
+                        <a:rPr lang="en-US" sz="1800" kern="1200" dirty="0" err="1">
+                          <a:solidFill>
+                            <a:schemeClr val="dk1"/>
+                          </a:solidFill>
+                          <a:effectLst/>
+                          <a:latin typeface="+mn-lt"/>
+                          <a:ea typeface="+mn-ea"/>
+                          <a:cs typeface="+mn-cs"/>
+                        </a:rPr>
+                        <a:t>độ</a:t>
+                      </a:r>
+                      <a:r>
+                        <a:rPr lang="en-US" sz="1800" kern="1200" dirty="0">
+                          <a:solidFill>
+                            <a:schemeClr val="dk1"/>
+                          </a:solidFill>
+                          <a:effectLst/>
+                          <a:latin typeface="+mn-lt"/>
+                          <a:ea typeface="+mn-ea"/>
+                          <a:cs typeface="+mn-cs"/>
+                        </a:rPr>
+                        <a:t> Celsius (</a:t>
+                      </a:r>
+                      <a:r>
+                        <a:rPr lang="en-US" sz="1800" kern="1200" dirty="0" err="1">
+                          <a:solidFill>
+                            <a:schemeClr val="dk1"/>
+                          </a:solidFill>
+                          <a:effectLst/>
+                          <a:latin typeface="+mn-lt"/>
+                          <a:ea typeface="+mn-ea"/>
+                          <a:cs typeface="+mn-cs"/>
+                        </a:rPr>
+                        <a:t>độ</a:t>
+                      </a:r>
+                      <a:r>
+                        <a:rPr lang="en-US" sz="1800" kern="1200" dirty="0">
+                          <a:solidFill>
+                            <a:schemeClr val="dk1"/>
+                          </a:solidFill>
+                          <a:effectLst/>
+                          <a:latin typeface="+mn-lt"/>
+                          <a:ea typeface="+mn-ea"/>
+                          <a:cs typeface="+mn-cs"/>
+                        </a:rPr>
+                        <a:t> </a:t>
+                      </a:r>
+                      <a:r>
+                        <a:rPr lang="en-US" sz="1800" kern="1200" dirty="0">
                           <a:solidFill>
                             <a:schemeClr val="dk1"/>
                           </a:solidFill>
@@ -12278,7 +13165,7 @@
                         <a:t></a:t>
                       </a:r>
                       <a:r>
-                        <a:rPr lang="en-US" sz="1800" kern="1200">
+                        <a:rPr lang="en-US" sz="1800" kern="1200" dirty="0">
                           <a:solidFill>
                             <a:schemeClr val="dk1"/>
                           </a:solidFill>
@@ -12370,6 +13257,59 @@
                                               <p:pRg st="0" end="0"/>
                                             </p:txEl>
                                           </p:spTgt>
+                                        </p:tgtEl>
+                                      </p:cBhvr>
+                                    </p:animEffect>
+                                  </p:childTnLst>
+                                </p:cTn>
+                              </p:par>
+                            </p:childTnLst>
+                          </p:cTn>
+                        </p:par>
+                      </p:childTnLst>
+                    </p:cTn>
+                  </p:par>
+                  <p:par>
+                    <p:cTn id="8" fill="hold">
+                      <p:stCondLst>
+                        <p:cond delay="indefinite"/>
+                      </p:stCondLst>
+                      <p:childTnLst>
+                        <p:par>
+                          <p:cTn id="9" fill="hold">
+                            <p:stCondLst>
+                              <p:cond delay="0"/>
+                            </p:stCondLst>
+                            <p:childTnLst>
+                              <p:par>
+                                <p:cTn id="10" presetID="22" presetClass="entr" presetSubtype="4" fill="hold" nodeType="clickEffect">
+                                  <p:stCondLst>
+                                    <p:cond delay="0"/>
+                                  </p:stCondLst>
+                                  <p:childTnLst>
+                                    <p:set>
+                                      <p:cBhvr>
+                                        <p:cTn id="11" dur="1" fill="hold">
+                                          <p:stCondLst>
+                                            <p:cond delay="0"/>
+                                          </p:stCondLst>
+                                        </p:cTn>
+                                        <p:tgtEl>
+                                          <p:spTgt spid="5"/>
+                                        </p:tgtEl>
+                                        <p:attrNameLst>
+                                          <p:attrName>style.visibility</p:attrName>
+                                        </p:attrNameLst>
+                                      </p:cBhvr>
+                                      <p:to>
+                                        <p:strVal val="visible"/>
+                                      </p:to>
+                                    </p:set>
+                                    <p:animEffect transition="in" filter="wipe(down)">
+                                      <p:cBhvr>
+                                        <p:cTn id="12" dur="500"/>
+                                        <p:tgtEl>
+                                          <p:spTgt spid="5"/>
                                         </p:tgtEl>
                                       </p:cBhvr>
                                     </p:animEffect>
@@ -12953,7 +13893,7 @@
                         <a:defRPr/>
                       </a:pPr>
                       <a:r>
-                        <a:rPr lang="en-US" sz="1800" kern="1200">
+                        <a:rPr lang="en-US" sz="1800" kern="1200" dirty="0" err="1">
                           <a:solidFill>
                             <a:schemeClr val="dk1"/>
                           </a:solidFill>
@@ -12962,8 +13902,137 @@
                           <a:ea typeface="+mn-ea"/>
                           <a:cs typeface="+mn-cs"/>
                         </a:rPr>
-                        <a:t>Tổng số lượng xe được thuê</a:t>
+                        <a:t>Tổng</a:t>
                       </a:r>
+                      <a:r>
+                        <a:rPr lang="en-US" sz="1800" kern="1200" dirty="0">
+                          <a:solidFill>
+                            <a:schemeClr val="dk1"/>
+                          </a:solidFill>
+                          <a:effectLst/>
+                          <a:latin typeface="+mn-lt"/>
+                          <a:ea typeface="+mn-ea"/>
+                          <a:cs typeface="+mn-cs"/>
+                        </a:rPr>
+                        <a:t> </a:t>
+                      </a:r>
+                      <a:r>
+                        <a:rPr lang="en-US" sz="1800" kern="1200" dirty="0" err="1">
+                          <a:solidFill>
+                            <a:schemeClr val="dk1"/>
+                          </a:solidFill>
+                          <a:effectLst/>
+                          <a:latin typeface="+mn-lt"/>
+                          <a:ea typeface="+mn-ea"/>
+                          <a:cs typeface="+mn-cs"/>
+                        </a:rPr>
+                        <a:t>số</a:t>
+                      </a:r>
+                      <a:r>
+                        <a:rPr lang="en-US" sz="1800" kern="1200" dirty="0">
+                          <a:solidFill>
+                            <a:schemeClr val="dk1"/>
+                          </a:solidFill>
+                          <a:effectLst/>
+                          <a:latin typeface="+mn-lt"/>
+                          <a:ea typeface="+mn-ea"/>
+                          <a:cs typeface="+mn-cs"/>
+                        </a:rPr>
+                        <a:t> </a:t>
+                      </a:r>
+                      <a:r>
+                        <a:rPr lang="en-US" sz="1800" kern="1200" dirty="0" err="1">
+                          <a:solidFill>
+                            <a:schemeClr val="dk1"/>
+                          </a:solidFill>
+                          <a:effectLst/>
+                          <a:latin typeface="+mn-lt"/>
+                          <a:ea typeface="+mn-ea"/>
+                          <a:cs typeface="+mn-cs"/>
+                        </a:rPr>
+                        <a:t>lượng</a:t>
+                      </a:r>
+                      <a:r>
+                        <a:rPr lang="en-US" sz="1800" kern="1200" dirty="0">
+                          <a:solidFill>
+                            <a:schemeClr val="dk1"/>
+                          </a:solidFill>
+                          <a:effectLst/>
+                          <a:latin typeface="+mn-lt"/>
+                          <a:ea typeface="+mn-ea"/>
+                          <a:cs typeface="+mn-cs"/>
+                        </a:rPr>
+                        <a:t> </a:t>
+                      </a:r>
+                      <a:r>
+                        <a:rPr lang="en-US" sz="1800" kern="1200" dirty="0" err="1">
+                          <a:solidFill>
+                            <a:schemeClr val="dk1"/>
+                          </a:solidFill>
+                          <a:effectLst/>
+                          <a:latin typeface="+mn-lt"/>
+                          <a:ea typeface="+mn-ea"/>
+                          <a:cs typeface="+mn-cs"/>
+                        </a:rPr>
+                        <a:t>xe</a:t>
+                      </a:r>
+                      <a:r>
+                        <a:rPr lang="en-US" sz="1800" kern="1200" dirty="0">
+                          <a:solidFill>
+                            <a:schemeClr val="dk1"/>
+                          </a:solidFill>
+                          <a:effectLst/>
+                          <a:latin typeface="+mn-lt"/>
+                          <a:ea typeface="+mn-ea"/>
+                          <a:cs typeface="+mn-cs"/>
+                        </a:rPr>
+                        <a:t> </a:t>
+                      </a:r>
+                      <a:r>
+                        <a:rPr lang="en-US" sz="1800" kern="1200" dirty="0" err="1">
+                          <a:solidFill>
+                            <a:schemeClr val="dk1"/>
+                          </a:solidFill>
+                          <a:effectLst/>
+                          <a:latin typeface="+mn-lt"/>
+                          <a:ea typeface="+mn-ea"/>
+                          <a:cs typeface="+mn-cs"/>
+                        </a:rPr>
+                        <a:t>được</a:t>
+                      </a:r>
+                      <a:r>
+                        <a:rPr lang="en-US" sz="1800" kern="1200" dirty="0">
+                          <a:solidFill>
+                            <a:schemeClr val="dk1"/>
+                          </a:solidFill>
+                          <a:effectLst/>
+                          <a:latin typeface="+mn-lt"/>
+                          <a:ea typeface="+mn-ea"/>
+                          <a:cs typeface="+mn-cs"/>
+                        </a:rPr>
+                        <a:t> </a:t>
+                      </a:r>
+                      <a:r>
+                        <a:rPr lang="en-US" sz="1800" kern="1200" dirty="0" err="1">
+                          <a:solidFill>
+                            <a:schemeClr val="dk1"/>
+                          </a:solidFill>
+                          <a:effectLst/>
+                          <a:latin typeface="+mn-lt"/>
+                          <a:ea typeface="+mn-ea"/>
+                          <a:cs typeface="+mn-cs"/>
+                        </a:rPr>
+                        <a:t>thuê</a:t>
+                      </a:r>
+                      <a:endParaRPr lang="en-US" sz="1800" kern="1200" dirty="0">
+                        <a:solidFill>
+                          <a:schemeClr val="dk1"/>
+                        </a:solidFill>
+                        <a:effectLst/>
+                        <a:latin typeface="+mn-lt"/>
+                        <a:ea typeface="+mn-ea"/>
+                        <a:cs typeface="+mn-cs"/>
+                      </a:endParaRPr>
                     </a:p>
                   </a:txBody>
                   <a:tcPr anchor="ctr"/>
@@ -13023,6 +14092,89 @@
   <p:clrMapOvr>
     <a:masterClrMapping/>
   </p:clrMapOvr>
+  <p:timing>
+    <p:tnLst>
+      <p:par>
+        <p:cTn id="1" dur="indefinite" restart="never" nodeType="tmRoot">
+          <p:childTnLst>
+            <p:seq concurrent="1" nextAc="seek">
+              <p:cTn id="2" dur="indefinite" nodeType="mainSeq">
+                <p:childTnLst>
+                  <p:par>
+                    <p:cTn id="3" fill="hold">
+                      <p:stCondLst>
+                        <p:cond delay="indefinite"/>
+                      </p:stCondLst>
+                      <p:childTnLst>
+                        <p:par>
+                          <p:cTn id="4" fill="hold">
+                            <p:stCondLst>
+                              <p:cond delay="0"/>
+                            </p:stCondLst>
+                            <p:childTnLst>
+                              <p:par>
+                                <p:cTn id="5" presetID="22" presetClass="entr" presetSubtype="4" fill="hold" nodeType="clickEffect">
+                                  <p:stCondLst>
+                                    <p:cond delay="0"/>
+                                  </p:stCondLst>
+                                  <p:childTnLst>
+                                    <p:set>
+                                      <p:cBhvr>
+                                        <p:cTn id="6" dur="1" fill="hold">
+                                          <p:stCondLst>
+                                            <p:cond delay="0"/>
+                                          </p:stCondLst>
+                                        </p:cTn>
+                                        <p:tgtEl>
+                                          <p:spTgt spid="3"/>
+                                        </p:tgtEl>
+                                        <p:attrNameLst>
+                                          <p:attrName>style.visibility</p:attrName>
+                                        </p:attrNameLst>
+                                      </p:cBhvr>
+                                      <p:to>
+                                        <p:strVal val="visible"/>
+                                      </p:to>
+                                    </p:set>
+                                    <p:animEffect transition="in" filter="wipe(down)">
+                                      <p:cBhvr>
+                                        <p:cTn id="7" dur="500"/>
+                                        <p:tgtEl>
+                                          <p:spTgt spid="3"/>
+                                        </p:tgtEl>
+                                      </p:cBhvr>
+                                    </p:animEffect>
+                                  </p:childTnLst>
+                                </p:cTn>
+                              </p:par>
+                            </p:childTnLst>
+                          </p:cTn>
+                        </p:par>
+                      </p:childTnLst>
+                    </p:cTn>
+                  </p:par>
+                </p:childTnLst>
+              </p:cTn>
+              <p:prevCondLst>
+                <p:cond evt="onPrev" delay="0">
+                  <p:tgtEl>
+                    <p:sldTgt/>
+                  </p:tgtEl>
+                </p:cond>
+              </p:prevCondLst>
+              <p:nextCondLst>
+                <p:cond evt="onNext" delay="0">
+                  <p:tgtEl>
+                    <p:sldTgt/>
+                  </p:tgtEl>
+                </p:cond>
+              </p:nextCondLst>
+            </p:seq>
+          </p:childTnLst>
+        </p:cTn>
+      </p:par>
+    </p:tnLst>
+  </p:timing>
 </p:sld>
 </file>
 
@@ -13307,11 +14459,11 @@
                     <a:lstStyle/>
                     <a:p>
                       <a:r>
-                        <a:rPr lang="en-US"/>
+                        <a:rPr lang="en-US" dirty="0"/>
                         <a:t>14. </a:t>
                       </a:r>
                       <a:r>
-                        <a:rPr lang="en-US" sz="1800" kern="1200">
+                        <a:rPr lang="en-US" sz="1800" kern="1200" dirty="0">
                           <a:solidFill>
                             <a:schemeClr val="dk1"/>
                           </a:solidFill>
@@ -13322,7 +14474,7 @@
                         </a:rPr>
                         <a:t>hour</a:t>
                       </a:r>
-                      <a:endParaRPr lang="en-US"/>
+                      <a:endParaRPr lang="en-US" dirty="0"/>
                     </a:p>
                   </a:txBody>
                   <a:tcPr anchor="ctr"/>
@@ -13421,7 +14573,7 @@
                         <a:defRPr/>
                       </a:pPr>
                       <a:r>
-                        <a:rPr lang="en-US" sz="1800" kern="1200">
+                        <a:rPr lang="en-US" sz="1800" kern="1200" dirty="0" err="1">
                           <a:solidFill>
                             <a:schemeClr val="dk1"/>
                           </a:solidFill>
@@ -13430,8 +14582,65 @@
                           <a:ea typeface="+mn-ea"/>
                           <a:cs typeface="+mn-cs"/>
                         </a:rPr>
-                        <a:t>Ngày trong tuần</a:t>
+                        <a:t>Ngày</a:t>
                       </a:r>
+                      <a:r>
+                        <a:rPr lang="en-US" sz="1800" kern="1200" dirty="0">
+                          <a:solidFill>
+                            <a:schemeClr val="dk1"/>
+                          </a:solidFill>
+                          <a:effectLst/>
+                          <a:latin typeface="+mn-lt"/>
+                          <a:ea typeface="+mn-ea"/>
+                          <a:cs typeface="+mn-cs"/>
+                        </a:rPr>
+                        <a:t> </a:t>
+                      </a:r>
+                      <a:r>
+                        <a:rPr lang="en-US" sz="1800" kern="1200" dirty="0" err="1">
+                          <a:solidFill>
+                            <a:schemeClr val="dk1"/>
+                          </a:solidFill>
+                          <a:effectLst/>
+                          <a:latin typeface="+mn-lt"/>
+                          <a:ea typeface="+mn-ea"/>
+                          <a:cs typeface="+mn-cs"/>
+                        </a:rPr>
+                        <a:t>trong</a:t>
+                      </a:r>
+                      <a:r>
+                        <a:rPr lang="en-US" sz="1800" kern="1200" dirty="0">
+                          <a:solidFill>
+                            <a:schemeClr val="dk1"/>
+                          </a:solidFill>
+                          <a:effectLst/>
+                          <a:latin typeface="+mn-lt"/>
+                          <a:ea typeface="+mn-ea"/>
+                          <a:cs typeface="+mn-cs"/>
+                        </a:rPr>
+                        <a:t> </a:t>
+                      </a:r>
+                      <a:r>
+                        <a:rPr lang="en-US" sz="1800" kern="1200" dirty="0" err="1">
+                          <a:solidFill>
+                            <a:schemeClr val="dk1"/>
+                          </a:solidFill>
+                          <a:effectLst/>
+                          <a:latin typeface="+mn-lt"/>
+                          <a:ea typeface="+mn-ea"/>
+                          <a:cs typeface="+mn-cs"/>
+                        </a:rPr>
+                        <a:t>tuần</a:t>
+                      </a:r>
+                      <a:endParaRPr lang="en-US" sz="1800" kern="1200" dirty="0">
+                        <a:solidFill>
+                          <a:schemeClr val="dk1"/>
+                        </a:solidFill>
+                        <a:effectLst/>
+                        <a:latin typeface="+mn-lt"/>
+                        <a:ea typeface="+mn-ea"/>
+                        <a:cs typeface="+mn-cs"/>
+                      </a:endParaRPr>
                     </a:p>
                   </a:txBody>
                   <a:tcPr anchor="ctr"/>
@@ -13486,6 +14695,89 @@
   <p:clrMapOvr>
     <a:masterClrMapping/>
   </p:clrMapOvr>
+  <p:timing>
+    <p:tnLst>
+      <p:par>
+        <p:cTn id="1" dur="indefinite" restart="never" nodeType="tmRoot">
+          <p:childTnLst>
+            <p:seq concurrent="1" nextAc="seek">
+              <p:cTn id="2" dur="indefinite" nodeType="mainSeq">
+                <p:childTnLst>
+                  <p:par>
+                    <p:cTn id="3" fill="hold">
+                      <p:stCondLst>
+                        <p:cond delay="indefinite"/>
+                      </p:stCondLst>
+                      <p:childTnLst>
+                        <p:par>
+                          <p:cTn id="4" fill="hold">
+                            <p:stCondLst>
+                              <p:cond delay="0"/>
+                            </p:stCondLst>
+                            <p:childTnLst>
+                              <p:par>
+                                <p:cTn id="5" presetID="22" presetClass="entr" presetSubtype="4" fill="hold" nodeType="clickEffect">
+                                  <p:stCondLst>
+                                    <p:cond delay="0"/>
+                                  </p:stCondLst>
+                                  <p:childTnLst>
+                                    <p:set>
+                                      <p:cBhvr>
+                                        <p:cTn id="6" dur="1" fill="hold">
+                                          <p:stCondLst>
+                                            <p:cond delay="0"/>
+                                          </p:stCondLst>
+                                        </p:cTn>
+                                        <p:tgtEl>
+                                          <p:spTgt spid="6"/>
+                                        </p:tgtEl>
+                                        <p:attrNameLst>
+                                          <p:attrName>style.visibility</p:attrName>
+                                        </p:attrNameLst>
+                                      </p:cBhvr>
+                                      <p:to>
+                                        <p:strVal val="visible"/>
+                                      </p:to>
+                                    </p:set>
+                                    <p:animEffect transition="in" filter="wipe(down)">
+                                      <p:cBhvr>
+                                        <p:cTn id="7" dur="500"/>
+                                        <p:tgtEl>
+                                          <p:spTgt spid="6"/>
+                                        </p:tgtEl>
+                                      </p:cBhvr>
+                                    </p:animEffect>
+                                  </p:childTnLst>
+                                </p:cTn>
+                              </p:par>
+                            </p:childTnLst>
+                          </p:cTn>
+                        </p:par>
+                      </p:childTnLst>
+                    </p:cTn>
+                  </p:par>
+                </p:childTnLst>
+              </p:cTn>
+              <p:prevCondLst>
+                <p:cond evt="onPrev" delay="0">
+                  <p:tgtEl>
+                    <p:sldTgt/>
+                  </p:tgtEl>
+                </p:cond>
+              </p:prevCondLst>
+              <p:nextCondLst>
+                <p:cond evt="onNext" delay="0">
+                  <p:tgtEl>
+                    <p:sldTgt/>
+                  </p:tgtEl>
+                </p:cond>
+              </p:nextCondLst>
+            </p:seq>
+          </p:childTnLst>
+        </p:cTn>
+      </p:par>
+    </p:tnLst>
+  </p:timing>
 </p:sld>
 </file>
 
@@ -13560,16 +14852,72 @@
               <a:buNone/>
             </a:pPr>
             <a:r>
-              <a:rPr lang="en-US"/>
-              <a:t>Tiền xử lý và phân tích dữ liệu</a:t>
-            </a:r>
-            <a:endParaRPr lang="en-US" sz="1400"/>
+              <a:rPr lang="en-US" dirty="0" err="1"/>
+              <a:t>Tiền</a:t>
+            </a:r>
+            <a:r>
+              <a:rPr lang="en-US" dirty="0"/>
+              <a:t> </a:t>
+            </a:r>
+            <a:r>
+              <a:rPr lang="en-US" dirty="0" err="1"/>
+              <a:t>xử</a:t>
+            </a:r>
+            <a:r>
+              <a:rPr lang="en-US" dirty="0"/>
+              <a:t> </a:t>
+            </a:r>
+            <a:r>
+              <a:rPr lang="en-US" dirty="0" err="1"/>
+              <a:t>lý</a:t>
+            </a:r>
+            <a:r>
+              <a:rPr lang="en-US" dirty="0"/>
+              <a:t> </a:t>
+            </a:r>
+            <a:r>
+              <a:rPr lang="en-US" dirty="0" err="1"/>
+              <a:t>và</a:t>
+            </a:r>
+            <a:r>
+              <a:rPr lang="en-US" dirty="0"/>
+              <a:t> </a:t>
+            </a:r>
+            <a:r>
+              <a:rPr lang="en-US" dirty="0" err="1"/>
+              <a:t>phân</a:t>
+            </a:r>
+            <a:r>
+              <a:rPr lang="en-US" dirty="0"/>
+              <a:t> </a:t>
+            </a:r>
+            <a:r>
+              <a:rPr lang="en-US" dirty="0" err="1"/>
+              <a:t>tích</a:t>
+            </a:r>
+            <a:r>
+              <a:rPr lang="en-US" dirty="0"/>
+              <a:t> </a:t>
+            </a:r>
+            <a:r>
+              <a:rPr lang="en-US" dirty="0" err="1"/>
+              <a:t>dữ</a:t>
+            </a:r>
+            <a:r>
+              <a:rPr lang="en-US" dirty="0"/>
+              <a:t> </a:t>
+            </a:r>
+            <a:r>
+              <a:rPr lang="en-US" dirty="0" err="1"/>
+              <a:t>liệu</a:t>
+            </a:r>
+            <a:endParaRPr lang="en-US" sz="1400" dirty="0"/>
           </a:p>
           <a:p>
             <a:pPr marL="0" indent="0">
               <a:buNone/>
             </a:pPr>
-            <a:endParaRPr lang="en-US" sz="1400"/>
+            <a:endParaRPr lang="en-US" sz="1400" dirty="0"/>
           </a:p>
         </p:txBody>
       </p:sp>
@@ -13687,6 +15035,188 @@
   <p:clrMapOvr>
     <a:masterClrMapping/>
   </p:clrMapOvr>
+  <p:timing>
+    <p:tnLst>
+      <p:par>
+        <p:cTn id="1" dur="indefinite" restart="never" nodeType="tmRoot">
+          <p:childTnLst>
+            <p:seq concurrent="1" nextAc="seek">
+              <p:cTn id="2" dur="indefinite" nodeType="mainSeq">
+                <p:childTnLst>
+                  <p:par>
+                    <p:cTn id="3" fill="hold">
+                      <p:stCondLst>
+                        <p:cond delay="indefinite"/>
+                      </p:stCondLst>
+                      <p:childTnLst>
+                        <p:par>
+                          <p:cTn id="4" fill="hold">
+                            <p:stCondLst>
+                              <p:cond delay="0"/>
+                            </p:stCondLst>
+                            <p:childTnLst>
+                              <p:par>
+                                <p:cTn id="5" presetID="22" presetClass="entr" presetSubtype="4" fill="hold" nodeType="clickEffect">
+                                  <p:stCondLst>
+                                    <p:cond delay="0"/>
+                                  </p:stCondLst>
+                                  <p:childTnLst>
+                                    <p:set>
+                                      <p:cBhvr>
+                                        <p:cTn id="6" dur="1" fill="hold">
+                                          <p:stCondLst>
+                                            <p:cond delay="0"/>
+                                          </p:stCondLst>
+                                        </p:cTn>
+                                        <p:tgtEl>
+                                          <p:spTgt spid="3">
+                                            <p:txEl>
+                                              <p:pRg st="0" end="0"/>
+                                            </p:txEl>
+                                          </p:spTgt>
+                                        </p:tgtEl>
+                                        <p:attrNameLst>
+                                          <p:attrName>style.visibility</p:attrName>
+                                        </p:attrNameLst>
+                                      </p:cBhvr>
+                                      <p:to>
+                                        <p:strVal val="visible"/>
+                                      </p:to>
+                                    </p:set>
+                                    <p:animEffect transition="in" filter="wipe(down)">
+                                      <p:cBhvr>
+                                        <p:cTn id="7" dur="500"/>
+                                        <p:tgtEl>
+                                          <p:spTgt spid="3">
+                                            <p:txEl>
+                                              <p:pRg st="0" end="0"/>
+                                            </p:txEl>
+                                          </p:spTgt>
+                                        </p:tgtEl>
+                                      </p:cBhvr>
+                                    </p:animEffect>
+                                  </p:childTnLst>
+                                </p:cTn>
+                              </p:par>
+                            </p:childTnLst>
+                          </p:cTn>
+                        </p:par>
+                      </p:childTnLst>
+                    </p:cTn>
+                  </p:par>
+                  <p:par>
+                    <p:cTn id="8" fill="hold">
+                      <p:stCondLst>
+                        <p:cond delay="indefinite"/>
+                      </p:stCondLst>
+                      <p:childTnLst>
+                        <p:par>
+                          <p:cTn id="9" fill="hold">
+                            <p:stCondLst>
+                              <p:cond delay="0"/>
+                            </p:stCondLst>
+                            <p:childTnLst>
+                              <p:par>
+                                <p:cTn id="10" presetID="22" presetClass="entr" presetSubtype="4" fill="hold" nodeType="clickEffect">
+                                  <p:stCondLst>
+                                    <p:cond delay="0"/>
+                                  </p:stCondLst>
+                                  <p:childTnLst>
+                                    <p:set>
+                                      <p:cBhvr>
+                                        <p:cTn id="11" dur="1" fill="hold">
+                                          <p:stCondLst>
+                                            <p:cond delay="0"/>
+                                          </p:stCondLst>
+                                        </p:cTn>
+                                        <p:tgtEl>
+                                          <p:spTgt spid="6"/>
+                                        </p:tgtEl>
+                                        <p:attrNameLst>
+                                          <p:attrName>style.visibility</p:attrName>
+                                        </p:attrNameLst>
+                                      </p:cBhvr>
+                                      <p:to>
+                                        <p:strVal val="visible"/>
+                                      </p:to>
+                                    </p:set>
+                                    <p:animEffect transition="in" filter="wipe(down)">
+                                      <p:cBhvr>
+                                        <p:cTn id="12" dur="500"/>
+                                        <p:tgtEl>
+                                          <p:spTgt spid="6"/>
+                                        </p:tgtEl>
+                                      </p:cBhvr>
+                                    </p:animEffect>
+                                  </p:childTnLst>
+                                </p:cTn>
+                              </p:par>
+                              <p:par>
+                                <p:cTn id="13" presetID="22" presetClass="entr" presetSubtype="4" fill="hold" grpId="0" nodeType="withEffect">
+                                  <p:stCondLst>
+                                    <p:cond delay="0"/>
+                                  </p:stCondLst>
+                                  <p:childTnLst>
+                                    <p:set>
+                                      <p:cBhvr>
+                                        <p:cTn id="14" dur="1" fill="hold">
+                                          <p:stCondLst>
+                                            <p:cond delay="0"/>
+                                          </p:stCondLst>
+                                        </p:cTn>
+                                        <p:tgtEl>
+                                          <p:spTgt spid="5"/>
+                                        </p:tgtEl>
+                                        <p:attrNameLst>
+                                          <p:attrName>style.visibility</p:attrName>
+                                        </p:attrNameLst>
+                                      </p:cBhvr>
+                                      <p:to>
+                                        <p:strVal val="visible"/>
+                                      </p:to>
+                                    </p:set>
+                                    <p:animEffect transition="in" filter="wipe(down)">
+                                      <p:cBhvr>
+                                        <p:cTn id="15" dur="500"/>
+                                        <p:tgtEl>
+                                          <p:spTgt spid="5"/>
+                                        </p:tgtEl>
+                                      </p:cBhvr>
+                                    </p:animEffect>
+                                  </p:childTnLst>
+                                </p:cTn>
+                              </p:par>
+                            </p:childTnLst>
+                          </p:cTn>
+                        </p:par>
+                      </p:childTnLst>
+                    </p:cTn>
+                  </p:par>
+                </p:childTnLst>
+              </p:cTn>
+              <p:prevCondLst>
+                <p:cond evt="onPrev" delay="0">
+                  <p:tgtEl>
+                    <p:sldTgt/>
+                  </p:tgtEl>
+                </p:cond>
+              </p:prevCondLst>
+              <p:nextCondLst>
+                <p:cond evt="onNext" delay="0">
+                  <p:tgtEl>
+                    <p:sldTgt/>
+                  </p:tgtEl>
+                </p:cond>
+              </p:nextCondLst>
+            </p:seq>
+          </p:childTnLst>
+        </p:cTn>
+      </p:par>
+    </p:tnLst>
+    <p:bldLst>
+      <p:bldP spid="5" grpId="0"/>
+    </p:bldLst>
+  </p:timing>
 </p:sld>
 </file>
 

</xml_diff>